<commit_message>
Added links to some slides
</commit_message>
<xml_diff>
--- a/beginning_vim-04.01.2012.pptx
+++ b/beginning_vim-04.01.2012.pptx
@@ -1572,27 +1572,11 @@
           <a:p>
             <a:r>
               <a:rPr lang="en-US" dirty="0" smtClean="0"/>
-              <a:t>Move </a:t>
-            </a:r>
-            <a:r>
-              <a:rPr lang="en-US" dirty="0" smtClean="0"/>
-              <a:t>around</a:t>
-            </a:r>
-            <a:r>
-              <a:rPr lang="en-US" dirty="0" smtClean="0"/>
-              <a:t>, edit, undo, refactoring,</a:t>
+              <a:t>Move around, edit, undo, refactoring,</a:t>
             </a:r>
             <a:r>
               <a:rPr lang="en-US" baseline="0" dirty="0" smtClean="0"/>
-              <a:t> indenting, autocomplete, </a:t>
-            </a:r>
-            <a:r>
-              <a:rPr lang="en-US" baseline="0" dirty="0" smtClean="0"/>
-              <a:t>search and replace, refactoring, indenting, autocomplete, </a:t>
-            </a:r>
-            <a:r>
-              <a:rPr lang="en-US" baseline="0" dirty="0" smtClean="0"/>
-              <a:t>diffing.</a:t>
+              <a:t> indenting, autocomplete, search and replace, refactoring, indenting, autocomplete, diffing.</a:t>
             </a:r>
           </a:p>
           <a:p>
@@ -1604,20 +1588,11 @@
               <a:rPr lang="en-US" baseline="0" dirty="0" smtClean="0"/>
               <a:t> key mappings, color schemes – all nice pluses.</a:t>
             </a:r>
-            <a:endParaRPr lang="en-US" baseline="0" dirty="0" smtClean="0"/>
           </a:p>
           <a:p>
             <a:r>
               <a:rPr lang="en-US" baseline="0" dirty="0" smtClean="0"/>
-              <a:t>Please open up a file or some </a:t>
-            </a:r>
-            <a:r>
-              <a:rPr lang="en-US" baseline="0" dirty="0" smtClean="0"/>
-              <a:t>code that you can edit. </a:t>
-            </a:r>
-            <a:r>
-              <a:rPr lang="en-US" baseline="0" dirty="0" smtClean="0"/>
-              <a:t>The best way to learn vim is by doing!</a:t>
+              <a:t>Please open up a file or some code that you can edit. The best way to learn vim is by doing!</a:t>
             </a:r>
             <a:endParaRPr lang="en-US" dirty="0"/>
           </a:p>
@@ -5316,36 +5291,20 @@
                   <a:schemeClr val="accent4"/>
                 </a:solidFill>
               </a:rPr>
-              <a:t>get </a:t>
-            </a:r>
+              <a:t>get used to hitting &lt;ESC&gt; after editing text</a:t>
+            </a:r>
+          </a:p>
+          <a:p>
+            <a:pPr marL="0" indent="0">
+              <a:buNone/>
+            </a:pPr>
             <a:r>
               <a:rPr lang="en-US" sz="2000" dirty="0" smtClean="0">
                 <a:solidFill>
                   <a:schemeClr val="accent4"/>
                 </a:solidFill>
               </a:rPr>
-              <a:t>used to hitting &lt;ESC&gt; after editing text</a:t>
-            </a:r>
-          </a:p>
-          <a:p>
-            <a:pPr marL="0" indent="0">
-              <a:buNone/>
-            </a:pPr>
-            <a:r>
-              <a:rPr lang="en-US" sz="2000" dirty="0" smtClean="0">
-                <a:solidFill>
-                  <a:schemeClr val="accent4"/>
-                </a:solidFill>
-              </a:rPr>
-              <a:t>you’ll </a:t>
-            </a:r>
-            <a:r>
-              <a:rPr lang="en-US" sz="2000" dirty="0" smtClean="0">
-                <a:solidFill>
-                  <a:schemeClr val="accent4"/>
-                </a:solidFill>
-              </a:rPr>
-              <a:t>always end in normal mode</a:t>
+              <a:t>you’ll always end in normal mode</a:t>
             </a:r>
             <a:endParaRPr lang="en-US" sz="2000" dirty="0">
               <a:solidFill>
@@ -5580,11 +5539,7 @@
           <a:p>
             <a:r>
               <a:rPr lang="en-US" dirty="0" smtClean="0"/>
-              <a:t>a letter does </a:t>
-            </a:r>
-            <a:r>
-              <a:rPr lang="en-US" dirty="0" smtClean="0"/>
-              <a:t>something</a:t>
+              <a:t>a letter does something</a:t>
             </a:r>
           </a:p>
           <a:p>
@@ -5593,11 +5548,7 @@
           <a:p>
             <a:r>
               <a:rPr lang="en-US" dirty="0" smtClean="0"/>
-              <a:t>shift modifies it in some </a:t>
-            </a:r>
-            <a:r>
-              <a:rPr lang="en-US" dirty="0" smtClean="0"/>
-              <a:t>way</a:t>
+              <a:t>shift modifies it in some way</a:t>
             </a:r>
           </a:p>
           <a:p>
@@ -5606,15 +5557,7 @@
           <a:p>
             <a:r>
               <a:rPr lang="en-US" dirty="0" smtClean="0"/>
-              <a:t>ctrl </a:t>
-            </a:r>
-            <a:r>
-              <a:rPr lang="en-US" dirty="0" smtClean="0"/>
-              <a:t>also modifies some </a:t>
-            </a:r>
-            <a:r>
-              <a:rPr lang="en-US" dirty="0" smtClean="0"/>
-              <a:t>keys</a:t>
+              <a:t>ctrl also modifies some keys</a:t>
             </a:r>
           </a:p>
           <a:p>
@@ -5625,7 +5568,6 @@
               <a:rPr lang="en-US" dirty="0" smtClean="0"/>
               <a:t>vim is full of patterns</a:t>
             </a:r>
-            <a:endParaRPr lang="en-US" dirty="0" smtClean="0"/>
           </a:p>
         </p:txBody>
       </p:sp>
@@ -6015,11 +5957,7 @@
           <a:p>
             <a:r>
               <a:rPr lang="en-US" dirty="0" smtClean="0"/>
-              <a:t>from </a:t>
-            </a:r>
-            <a:r>
-              <a:rPr lang="en-US" dirty="0" smtClean="0"/>
-              <a:t>normal mode, type :</a:t>
+              <a:t>from normal mode, type :</a:t>
             </a:r>
           </a:p>
           <a:p>
@@ -6061,13 +5999,8 @@
           <a:p>
             <a:r>
               <a:rPr lang="en-US" dirty="0" smtClean="0"/>
-              <a:t>:</a:t>
-            </a:r>
-            <a:r>
-              <a:rPr lang="en-US" dirty="0" smtClean="0"/>
-              <a:t>help :e</a:t>
-            </a:r>
-            <a:endParaRPr lang="en-US" dirty="0" smtClean="0"/>
+              <a:t>:help :e</a:t>
+            </a:r>
           </a:p>
         </p:txBody>
       </p:sp>
@@ -6148,23 +6081,14 @@
           <a:p>
             <a:r>
               <a:rPr lang="en-US" dirty="0" smtClean="0"/>
-              <a:t>move around the file with certain motion </a:t>
-            </a:r>
-            <a:r>
-              <a:rPr lang="en-US" dirty="0" smtClean="0"/>
-              <a:t>keys</a:t>
-            </a:r>
-            <a:endParaRPr lang="en-US" dirty="0" smtClean="0"/>
+              <a:t>move around the file with certain motion keys</a:t>
+            </a:r>
           </a:p>
           <a:p>
             <a:pPr lvl="1"/>
             <a:r>
               <a:rPr lang="en-US" dirty="0" smtClean="0"/>
-              <a:t>w – start of next </a:t>
-            </a:r>
-            <a:r>
-              <a:rPr lang="en-US" dirty="0" smtClean="0"/>
-              <a:t>word</a:t>
+              <a:t>w – start of next word</a:t>
             </a:r>
           </a:p>
           <a:p>
@@ -6175,11 +6099,7 @@
             <a:pPr lvl="1"/>
             <a:r>
               <a:rPr lang="en-US" dirty="0" smtClean="0"/>
-              <a:t>e – end of this </a:t>
-            </a:r>
-            <a:r>
-              <a:rPr lang="en-US" dirty="0" smtClean="0"/>
-              <a:t>word</a:t>
+              <a:t>e – end of this word</a:t>
             </a:r>
           </a:p>
           <a:p>
@@ -6190,13 +6110,8 @@
             <a:pPr lvl="1"/>
             <a:r>
               <a:rPr lang="en-US" dirty="0" smtClean="0"/>
-              <a:t>b – back a </a:t>
-            </a:r>
-            <a:r>
-              <a:rPr lang="en-US" dirty="0" smtClean="0"/>
-              <a:t>word</a:t>
-            </a:r>
-            <a:endParaRPr lang="en-US" dirty="0" smtClean="0"/>
+              <a:t>b – back a word</a:t>
+            </a:r>
           </a:p>
         </p:txBody>
       </p:sp>
@@ -6365,7 +6280,6 @@
               <a:rPr lang="en-US" dirty="0"/>
               <a:t>motions</a:t>
             </a:r>
-            <a:endParaRPr lang="en-US" dirty="0"/>
           </a:p>
         </p:txBody>
       </p:sp>
@@ -6403,17 +6317,8 @@
             <a:pPr lvl="1"/>
             <a:r>
               <a:rPr lang="en-US" dirty="0" smtClean="0"/>
-              <a:t>G </a:t>
-            </a:r>
-            <a:r>
-              <a:rPr lang="en-US" dirty="0" smtClean="0"/>
-              <a:t>– end of </a:t>
-            </a:r>
-            <a:r>
-              <a:rPr lang="en-US" dirty="0" smtClean="0"/>
-              <a:t>file</a:t>
-            </a:r>
-            <a:endParaRPr lang="en-US" dirty="0" smtClean="0"/>
+              <a:t>G – end of file</a:t>
+            </a:r>
           </a:p>
           <a:p>
             <a:endParaRPr lang="en-US" dirty="0" smtClean="0"/>
@@ -6658,7 +6563,7 @@
         <p:spPr>
           <a:xfrm>
             <a:off x="5413492" y="6498096"/>
-            <a:ext cx="3730508" cy="369332"/>
+            <a:ext cx="3730508" cy="646331"/>
           </a:xfrm>
           <a:prstGeom prst="rect">
             <a:avLst/>
@@ -6676,9 +6581,19 @@
                   <a:schemeClr val="accent3"/>
                 </a:solidFill>
               </a:rPr>
-              <a:t>https://github.com/kyletolle</a:t>
-            </a:r>
-            <a:endParaRPr lang="en-US" dirty="0">
+              <a:t>https://</a:t>
+            </a:r>
+            <a:r>
+              <a:rPr lang="en-US" dirty="0" smtClean="0">
+                <a:solidFill>
+                  <a:schemeClr val="accent3"/>
+                </a:solidFill>
+              </a:rPr>
+              <a:t>github.com/kyletolle</a:t>
+            </a:r>
+          </a:p>
+          <a:p>
+            <a:endParaRPr lang="en-US" dirty="0" smtClean="0">
               <a:solidFill>
                 <a:schemeClr val="accent3"/>
               </a:solidFill>
@@ -6887,11 +6802,7 @@
           <a:p>
             <a:r>
               <a:rPr lang="en-US" dirty="0" smtClean="0"/>
-              <a:t>general formula </a:t>
-            </a:r>
-            <a:r>
-              <a:rPr lang="en-US" dirty="0" smtClean="0"/>
-              <a:t>is</a:t>
+              <a:t>general formula is</a:t>
             </a:r>
           </a:p>
           <a:p>
@@ -6905,11 +6816,7 @@
             <a:pPr lvl="2"/>
             <a:r>
               <a:rPr lang="en-US" dirty="0" smtClean="0"/>
-              <a:t>perform </a:t>
-            </a:r>
-            <a:r>
-              <a:rPr lang="en-US" dirty="0" smtClean="0"/>
-              <a:t>the command this many times</a:t>
+              <a:t>perform the command this many times</a:t>
             </a:r>
           </a:p>
           <a:p>
@@ -6920,22 +6827,14 @@
             </a:r>
             <a:r>
               <a:rPr lang="en-US" dirty="0" smtClean="0"/>
-              <a:t>hat </a:t>
-            </a:r>
-            <a:r>
-              <a:rPr lang="en-US" dirty="0" smtClean="0"/>
-              <a:t>command to perform</a:t>
+              <a:t>hat command to perform</a:t>
             </a:r>
           </a:p>
           <a:p>
             <a:pPr lvl="2"/>
             <a:r>
               <a:rPr lang="en-US" dirty="0" smtClean="0"/>
-              <a:t>what </a:t>
-            </a:r>
-            <a:r>
-              <a:rPr lang="en-US" dirty="0" smtClean="0"/>
-              <a:t>motion to perform the command over</a:t>
+              <a:t>what motion to perform the command over</a:t>
             </a:r>
             <a:endParaRPr lang="en-US" dirty="0"/>
           </a:p>
@@ -7013,11 +6912,7 @@
           <a:p>
             <a:r>
               <a:rPr lang="en-US" dirty="0" smtClean="0"/>
-              <a:t>manipulate text from normal </a:t>
-            </a:r>
-            <a:r>
-              <a:rPr lang="en-US" dirty="0" smtClean="0"/>
-              <a:t>mode</a:t>
+              <a:t>manipulate text from normal mode</a:t>
             </a:r>
           </a:p>
           <a:p>
@@ -7027,11 +6922,7 @@
             <a:pPr lvl="1"/>
             <a:r>
               <a:rPr lang="en-US" dirty="0" smtClean="0"/>
-              <a:t>d{motion} </a:t>
-            </a:r>
-            <a:r>
-              <a:rPr lang="en-US" dirty="0" smtClean="0"/>
-              <a:t>– delete</a:t>
+              <a:t>d{motion} – delete</a:t>
             </a:r>
           </a:p>
           <a:p>
@@ -7041,11 +6932,7 @@
             <a:pPr lvl="1"/>
             <a:r>
               <a:rPr lang="en-US" dirty="0" smtClean="0"/>
-              <a:t>c{motion} – </a:t>
-            </a:r>
-            <a:r>
-              <a:rPr lang="en-US" dirty="0" smtClean="0"/>
-              <a:t>change</a:t>
+              <a:t>c{motion} – change</a:t>
             </a:r>
           </a:p>
           <a:p>
@@ -7235,19 +7122,13 @@
               <a:rPr lang="en-US" dirty="0" smtClean="0"/>
               <a:t> - delete</a:t>
             </a:r>
-            <a:endParaRPr lang="en-US" dirty="0" smtClean="0"/>
           </a:p>
           <a:p>
             <a:pPr lvl="1"/>
             <a:r>
               <a:rPr lang="en-US" dirty="0" smtClean="0"/>
-              <a:t>cc </a:t>
-            </a:r>
-            <a:r>
-              <a:rPr lang="en-US" dirty="0" smtClean="0"/>
-              <a:t>- change</a:t>
-            </a:r>
-            <a:endParaRPr lang="en-US" dirty="0" smtClean="0"/>
+              <a:t>cc - change</a:t>
+            </a:r>
           </a:p>
           <a:p>
             <a:pPr lvl="1"/>
@@ -7499,21 +7380,13 @@
           <a:p>
             <a:r>
               <a:rPr lang="en-US" dirty="0" smtClean="0"/>
-              <a:t>u </a:t>
-            </a:r>
-            <a:r>
-              <a:rPr lang="en-US" dirty="0" smtClean="0"/>
-              <a:t>– undo</a:t>
-            </a:r>
-          </a:p>
-          <a:p>
-            <a:r>
-              <a:rPr lang="en-US" dirty="0" smtClean="0"/>
-              <a:t>U – undo all changes made to this </a:t>
-            </a:r>
-            <a:r>
-              <a:rPr lang="en-US" dirty="0" smtClean="0"/>
-              <a:t>line</a:t>
+              <a:t>u – undo</a:t>
+            </a:r>
+          </a:p>
+          <a:p>
+            <a:r>
+              <a:rPr lang="en-US" dirty="0" smtClean="0"/>
+              <a:t>U – undo all changes made to this line</a:t>
             </a:r>
           </a:p>
           <a:p>
@@ -7522,13 +7395,8 @@
           <a:p>
             <a:r>
               <a:rPr lang="en-US" dirty="0" smtClean="0"/>
-              <a:t>Ctrl-r – </a:t>
-            </a:r>
-            <a:r>
-              <a:rPr lang="en-US" dirty="0" smtClean="0"/>
-              <a:t>redo</a:t>
-            </a:r>
-            <a:endParaRPr lang="en-US" dirty="0" smtClean="0"/>
+              <a:t>Ctrl-r – redo</a:t>
+            </a:r>
           </a:p>
         </p:txBody>
       </p:sp>
@@ -7717,25 +7585,13 @@
           <a:p>
             <a:r>
               <a:rPr lang="en-US" dirty="0" smtClean="0"/>
-              <a:t>/{text} </a:t>
-            </a:r>
-            <a:r>
-              <a:rPr lang="en-US" dirty="0" smtClean="0"/>
-              <a:t>- search forward</a:t>
-            </a:r>
-          </a:p>
-          <a:p>
-            <a:r>
-              <a:rPr lang="en-US" dirty="0" smtClean="0"/>
-              <a:t>?{text} </a:t>
-            </a:r>
-            <a:r>
-              <a:rPr lang="en-US" dirty="0" smtClean="0"/>
-              <a:t>– search </a:t>
-            </a:r>
-            <a:r>
-              <a:rPr lang="en-US" dirty="0" smtClean="0"/>
-              <a:t>backward</a:t>
+              <a:t>/{text} - search forward</a:t>
+            </a:r>
+          </a:p>
+          <a:p>
+            <a:r>
+              <a:rPr lang="en-US" dirty="0" smtClean="0"/>
+              <a:t>?{text} – search backward</a:t>
             </a:r>
           </a:p>
           <a:p>
@@ -8093,11 +7949,7 @@
           <a:p>
             <a:r>
               <a:rPr lang="en-US" dirty="0" smtClean="0"/>
-              <a:t>:s/old/new – replace first occurrence of old with new on this </a:t>
-            </a:r>
-            <a:r>
-              <a:rPr lang="en-US" dirty="0" smtClean="0"/>
-              <a:t>line</a:t>
+              <a:t>:s/old/new – replace first occurrence of old with new on this line</a:t>
             </a:r>
           </a:p>
           <a:p>
@@ -8125,30 +7977,14 @@
             <a:pPr lvl="2"/>
             <a:r>
               <a:rPr lang="en-US" dirty="0" smtClean="0"/>
-              <a:t>g – </a:t>
-            </a:r>
-            <a:r>
-              <a:rPr lang="en-US" dirty="0" smtClean="0"/>
-              <a:t>global - </a:t>
-            </a:r>
-            <a:r>
-              <a:rPr lang="en-US" dirty="0" smtClean="0"/>
-              <a:t>replaces all occurrences on line</a:t>
+              <a:t>g – global - replaces all occurrences on line</a:t>
             </a:r>
           </a:p>
           <a:p>
             <a:pPr lvl="2"/>
             <a:r>
               <a:rPr lang="en-US" dirty="0" smtClean="0"/>
-              <a:t>c – </a:t>
-            </a:r>
-            <a:r>
-              <a:rPr lang="en-US" dirty="0" smtClean="0"/>
-              <a:t>confirmation - </a:t>
-            </a:r>
-            <a:r>
-              <a:rPr lang="en-US" dirty="0" smtClean="0"/>
-              <a:t>prompts confirmation each time</a:t>
+              <a:t>c – confirmation - prompts confirmation each time</a:t>
             </a:r>
           </a:p>
           <a:p>
@@ -8157,15 +7993,7 @@
           <a:p>
             <a:r>
               <a:rPr lang="en-US" dirty="0" smtClean="0"/>
-              <a:t>:%</a:t>
-            </a:r>
-            <a:r>
-              <a:rPr lang="en-US" dirty="0" smtClean="0"/>
-              <a:t>s/old/new/ - replace first occurrence of old with new on all lines in whole </a:t>
-            </a:r>
-            <a:r>
-              <a:rPr lang="en-US" dirty="0" smtClean="0"/>
-              <a:t>file</a:t>
+              <a:t>:%s/old/new/ - replace first occurrence of old with new on all lines in whole file</a:t>
             </a:r>
           </a:p>
           <a:p>
@@ -8277,11 +8105,7 @@
             </a:r>
             <a:r>
               <a:rPr lang="en-US" dirty="0" smtClean="0"/>
-              <a:t> – buffer </a:t>
-            </a:r>
-            <a:r>
-              <a:rPr lang="en-US" dirty="0" smtClean="0"/>
-              <a:t>delete</a:t>
+              <a:t> – buffer delete</a:t>
             </a:r>
           </a:p>
           <a:p>
@@ -8290,11 +8114,7 @@
           <a:p>
             <a:r>
               <a:rPr lang="en-US" dirty="0" smtClean="0"/>
-              <a:t>:</a:t>
-            </a:r>
-            <a:r>
-              <a:rPr lang="en-US" dirty="0" smtClean="0"/>
-              <a:t>e(</a:t>
+              <a:t>:e(</a:t>
             </a:r>
             <a:r>
               <a:rPr lang="en-US" dirty="0" err="1" smtClean="0"/>
@@ -8302,11 +8122,7 @@
             </a:r>
             <a:r>
               <a:rPr lang="en-US" dirty="0" smtClean="0"/>
-              <a:t>) </a:t>
-            </a:r>
-            <a:r>
-              <a:rPr lang="en-US" dirty="0" smtClean="0"/>
-              <a:t>{filename</a:t>
+              <a:t>) {filename</a:t>
             </a:r>
             <a:r>
               <a:rPr lang="en-US" sz="3600" dirty="0" smtClean="0"/>
@@ -8314,15 +8130,7 @@
             </a:r>
             <a:r>
               <a:rPr lang="en-US" dirty="0" smtClean="0"/>
-              <a:t> - edit </a:t>
-            </a:r>
-            <a:r>
-              <a:rPr lang="en-US" dirty="0" smtClean="0"/>
-              <a:t>filename in the </a:t>
-            </a:r>
-            <a:r>
-              <a:rPr lang="en-US" dirty="0" smtClean="0"/>
-              <a:t>current window – creates new buffer</a:t>
+              <a:t> - edit filename in the current window – creates new buffer</a:t>
             </a:r>
             <a:endParaRPr lang="en-US" dirty="0"/>
           </a:p>
@@ -8418,7 +8226,11 @@
           <a:p>
             <a:r>
               <a:rPr lang="en-US" dirty="0" smtClean="0"/>
-              <a:t>Show spec and code side by side</a:t>
+              <a:t>edit </a:t>
+            </a:r>
+            <a:r>
+              <a:rPr lang="en-US" dirty="0" smtClean="0"/>
+              <a:t>spec and code side by side</a:t>
             </a:r>
             <a:endParaRPr lang="en-US" dirty="0"/>
           </a:p>
@@ -8772,10 +8584,24 @@
           <a:p>
             <a:pPr lvl="1"/>
             <a:r>
-              <a:rPr lang="en-US" dirty="0"/>
-              <a:t>https://github.com/kyletolle/dotfiles</a:t>
-            </a:r>
-            <a:endParaRPr lang="en-US" dirty="0" smtClean="0"/>
+              <a:rPr lang="en-US" dirty="0">
+                <a:hlinkClick r:id="rId2"/>
+              </a:rPr>
+              <a:t>https</a:t>
+            </a:r>
+            <a:r>
+              <a:rPr lang="en-US">
+                <a:hlinkClick r:id="rId2"/>
+              </a:rPr>
+              <a:t>://</a:t>
+            </a:r>
+            <a:r>
+              <a:rPr lang="en-US" smtClean="0">
+                <a:hlinkClick r:id="rId2"/>
+              </a:rPr>
+              <a:t>github.com/kyletolle/dotfiles</a:t>
+            </a:r>
+            <a:endParaRPr lang="en-US" smtClean="0"/>
           </a:p>
           <a:p>
             <a:endParaRPr lang="en-US" dirty="0"/>
@@ -8889,23 +8715,14 @@
               <a:rPr lang="en-US" dirty="0" smtClean="0"/>
               <a:t>solarized is a popular one</a:t>
             </a:r>
+          </a:p>
+          <a:p>
             <a:endParaRPr lang="en-US" dirty="0" smtClean="0"/>
           </a:p>
           <a:p>
-            <a:endParaRPr lang="en-US" dirty="0" smtClean="0"/>
-          </a:p>
-          <a:p>
-            <a:r>
-              <a:rPr lang="en-US" dirty="0" smtClean="0"/>
-              <a:t>color </a:t>
-            </a:r>
-            <a:r>
-              <a:rPr lang="en-US" dirty="0" smtClean="0"/>
-              <a:t>packs you can </a:t>
-            </a:r>
-            <a:r>
-              <a:rPr lang="en-US" dirty="0" smtClean="0"/>
-              <a:t>download</a:t>
+            <a:r>
+              <a:rPr lang="en-US" dirty="0" smtClean="0"/>
+              <a:t>color packs you can download</a:t>
             </a:r>
           </a:p>
           <a:p>
@@ -9116,11 +8933,7 @@
             </a:r>
             <a:r>
               <a:rPr lang="en-US" dirty="0" smtClean="0"/>
-              <a:t> file1 </a:t>
-            </a:r>
-            <a:r>
-              <a:rPr lang="en-US" dirty="0" smtClean="0"/>
-              <a:t>file2</a:t>
+              <a:t> file1 file2</a:t>
             </a:r>
           </a:p>
           <a:p>
@@ -9129,58 +8942,44 @@
               <a:rPr lang="en-US" dirty="0" smtClean="0"/>
               <a:t>commands related to diffing/merging files</a:t>
             </a:r>
+          </a:p>
+          <a:p>
             <a:endParaRPr lang="en-US" dirty="0" smtClean="0"/>
           </a:p>
           <a:p>
+            <a:r>
+              <a:rPr lang="en-US" dirty="0" smtClean="0"/>
+              <a:t>folds</a:t>
+            </a:r>
+          </a:p>
+          <a:p>
+            <a:pPr lvl="1"/>
+            <a:r>
+              <a:rPr lang="en-US" dirty="0" smtClean="0"/>
+              <a:t>collapse blocks of code</a:t>
+            </a:r>
+          </a:p>
+          <a:p>
             <a:endParaRPr lang="en-US" dirty="0" smtClean="0"/>
           </a:p>
           <a:p>
             <a:r>
               <a:rPr lang="en-US" dirty="0" smtClean="0"/>
-              <a:t>folds</a:t>
+              <a:t>marks – jump around file easier</a:t>
             </a:r>
           </a:p>
           <a:p>
             <a:pPr lvl="1"/>
             <a:r>
               <a:rPr lang="en-US" dirty="0" smtClean="0"/>
-              <a:t>collapse </a:t>
-            </a:r>
-            <a:r>
-              <a:rPr lang="en-US" dirty="0" smtClean="0"/>
-              <a:t>blocks of </a:t>
-            </a:r>
-            <a:r>
-              <a:rPr lang="en-US" dirty="0" smtClean="0"/>
-              <a:t>code</a:t>
-            </a:r>
-          </a:p>
-          <a:p>
-            <a:endParaRPr lang="en-US" dirty="0" smtClean="0"/>
-          </a:p>
-          <a:p>
-            <a:r>
-              <a:rPr lang="en-US" dirty="0" smtClean="0"/>
-              <a:t>marks – jump around file easier</a:t>
+              <a:t>ma – mark the current like as a</a:t>
             </a:r>
           </a:p>
           <a:p>
             <a:pPr lvl="1"/>
             <a:r>
               <a:rPr lang="en-US" dirty="0" smtClean="0"/>
-              <a:t>ma – mark the current like as a</a:t>
-            </a:r>
-            <a:endParaRPr lang="en-US" dirty="0" smtClean="0"/>
-          </a:p>
-          <a:p>
-            <a:pPr lvl="1"/>
-            <a:r>
-              <a:rPr lang="en-US" dirty="0" smtClean="0"/>
-              <a:t>‘</a:t>
-            </a:r>
-            <a:r>
-              <a:rPr lang="en-US" dirty="0" smtClean="0"/>
-              <a:t>a – jump to mark a</a:t>
+              <a:t>‘a – jump to mark a</a:t>
             </a:r>
           </a:p>
           <a:p>
@@ -9829,21 +9628,14 @@
         </p:nvSpPr>
         <p:spPr/>
         <p:txBody>
-          <a:bodyPr/>
-          <a:lstStyle/>
-          <a:p>
-            <a:r>
-              <a:rPr lang="en-US" dirty="0" smtClean="0"/>
-              <a:t>thanks for being here</a:t>
-            </a:r>
-          </a:p>
-          <a:p>
-            <a:endParaRPr lang="en-US" dirty="0"/>
-          </a:p>
+          <a:bodyPr>
+            <a:normAutofit/>
+          </a:bodyPr>
+          <a:lstStyle/>
           <a:p>
             <a:r>
               <a:rPr lang="en-US" dirty="0" err="1" smtClean="0"/>
-              <a:t>i’d</a:t>
+              <a:t>i</a:t>
             </a:r>
             <a:r>
               <a:rPr lang="en-US" dirty="0" smtClean="0"/>
@@ -9870,9 +9662,49 @@
           <a:p>
             <a:pPr lvl="1"/>
             <a:r>
-              <a:rPr lang="en-US" dirty="0"/>
-              <a:t>https://github.com/kyletolle/talks</a:t>
-            </a:r>
+              <a:rPr lang="en-US" dirty="0">
+                <a:hlinkClick r:id="rId2"/>
+              </a:rPr>
+              <a:t>https://</a:t>
+            </a:r>
+            <a:r>
+              <a:rPr lang="en-US" dirty="0" smtClean="0">
+                <a:hlinkClick r:id="rId2"/>
+              </a:rPr>
+              <a:t>github.com/kyletolle/talks</a:t>
+            </a:r>
+            <a:endParaRPr lang="en-US" dirty="0" smtClean="0"/>
+          </a:p>
+          <a:p>
+            <a:pPr lvl="1"/>
+            <a:endParaRPr lang="en-US" dirty="0" smtClean="0"/>
+          </a:p>
+          <a:p>
+            <a:r>
+              <a:rPr lang="en-US" dirty="0" err="1" smtClean="0"/>
+              <a:t>cheatsheet</a:t>
+            </a:r>
+            <a:endParaRPr lang="en-US" dirty="0" smtClean="0"/>
+          </a:p>
+          <a:p>
+            <a:pPr lvl="1"/>
+            <a:r>
+              <a:rPr lang="en-US" dirty="0">
+                <a:hlinkClick r:id="rId3"/>
+              </a:rPr>
+              <a:t>http://</a:t>
+            </a:r>
+            <a:r>
+              <a:rPr lang="en-US" dirty="0" smtClean="0">
+                <a:hlinkClick r:id="rId3"/>
+              </a:rPr>
+              <a:t>simpletutorials.com/tutorials/vim/vimquick.pdf</a:t>
+            </a:r>
+            <a:endParaRPr lang="en-US" dirty="0" smtClean="0"/>
+          </a:p>
+          <a:p>
+            <a:pPr lvl="1"/>
+            <a:endParaRPr lang="en-US" dirty="0"/>
           </a:p>
         </p:txBody>
       </p:sp>
@@ -10002,15 +9834,7 @@
             <a:pPr lvl="1"/>
             <a:r>
               <a:rPr lang="en-US" dirty="0" smtClean="0"/>
-              <a:t>:</a:t>
-            </a:r>
-            <a:r>
-              <a:rPr lang="en-US" dirty="0" smtClean="0"/>
-              <a:t>help tutor </a:t>
-            </a:r>
-            <a:r>
-              <a:rPr lang="en-US" dirty="0" smtClean="0"/>
-              <a:t>(from within vim)</a:t>
+              <a:t>:help tutor (from within vim)</a:t>
             </a:r>
           </a:p>
           <a:p>
@@ -10338,11 +10162,7 @@
           <a:p>
             <a:r>
               <a:rPr lang="en-US" dirty="0" smtClean="0"/>
-              <a:t>not </a:t>
-            </a:r>
-            <a:r>
-              <a:rPr lang="en-US" dirty="0" smtClean="0"/>
-              <a:t>for typing text</a:t>
+              <a:t>not for typing text</a:t>
             </a:r>
           </a:p>
           <a:p>
@@ -10351,11 +10171,7 @@
           <a:p>
             <a:r>
               <a:rPr lang="en-US" dirty="0" smtClean="0"/>
-              <a:t>&lt;ESC&gt; gets you back to normal mode from any other </a:t>
-            </a:r>
-            <a:r>
-              <a:rPr lang="en-US" dirty="0" smtClean="0"/>
-              <a:t>mode</a:t>
+              <a:t>&lt;ESC&gt; gets you back to normal mode from any other mode</a:t>
             </a:r>
           </a:p>
           <a:p>
@@ -10773,10 +10589,10 @@
         <a:srgbClr val="F79646"/>
       </a:accent6>
       <a:hlink>
-        <a:srgbClr val="0000FF"/>
+        <a:srgbClr val="EEEEEE"/>
       </a:hlink>
       <a:folHlink>
-        <a:srgbClr val="800080"/>
+        <a:srgbClr val="EEEEEE"/>
       </a:folHlink>
     </a:clrScheme>
     <a:fontScheme name="vim">

</xml_diff>